<commit_message>
Added another image (still incomplete)
</commit_message>
<xml_diff>
--- a/ProjectPres.pptx
+++ b/ProjectPres.pptx
@@ -174,7 +174,7 @@
         <p:txBody>
           <a:bodyPr/>
           <a:p>
-            <a:fld id="{B5915918-CA11-4E9D-A0FD-888477DCDBCC}" type="slidenum">
+            <a:fld id="{F7CD185B-D2B1-4F8B-8E64-6D9AD04F59E1}" type="slidenum">
               <a:t>&lt;#&gt;</a:t>
             </a:fld>
           </a:p>
@@ -257,7 +257,7 @@
         <p:txBody>
           <a:bodyPr/>
           <a:p>
-            <a:fld id="{23176E29-48A0-453E-9BF4-3A89C87B05FB}" type="slidenum">
+            <a:fld id="{7CC31141-D1E4-4ECA-9FEC-F1E16600D918}" type="slidenum">
               <a:t>&lt;#&gt;</a:t>
             </a:fld>
           </a:p>
@@ -340,7 +340,7 @@
         <p:txBody>
           <a:bodyPr/>
           <a:p>
-            <a:fld id="{6166D28C-5216-415C-ABAB-79FE801659A5}" type="slidenum">
+            <a:fld id="{06979AA3-EC75-4AD3-AF1D-A299F8FED0F0}" type="slidenum">
               <a:t>&lt;#&gt;</a:t>
             </a:fld>
           </a:p>
@@ -423,7 +423,7 @@
         <p:txBody>
           <a:bodyPr/>
           <a:p>
-            <a:fld id="{59D8EBCB-0E03-4185-9A2C-E53F513E40AF}" type="slidenum">
+            <a:fld id="{2AE10566-F74A-4A2B-9A87-25B44F0F7B0D}" type="slidenum">
               <a:t>&lt;#&gt;</a:t>
             </a:fld>
           </a:p>
@@ -506,7 +506,7 @@
         <p:txBody>
           <a:bodyPr/>
           <a:p>
-            <a:fld id="{656E2FEA-A008-46F4-8F03-2D806C4FE0B2}" type="slidenum">
+            <a:fld id="{4184D6D1-443E-4BCF-8B5F-5E34410558F8}" type="slidenum">
               <a:t>&lt;#&gt;</a:t>
             </a:fld>
           </a:p>
@@ -675,7 +675,7 @@
         <p:txBody>
           <a:bodyPr/>
           <a:p>
-            <a:fld id="{7055BC59-84A1-40A5-ABA4-3D7C3605C6F8}" type="slidenum">
+            <a:fld id="{E52ECA7F-8F12-48B8-911F-9122CFB20CC5}" type="slidenum">
               <a:t>&lt;#&gt;</a:t>
             </a:fld>
           </a:p>
@@ -758,7 +758,7 @@
         <p:txBody>
           <a:bodyPr/>
           <a:p>
-            <a:fld id="{F2A38F27-BE3C-4C32-AE9C-1819BC7E6C76}" type="slidenum">
+            <a:fld id="{7A36DA81-1A70-47F4-B71A-44C909136FC2}" type="slidenum">
               <a:t>&lt;#&gt;</a:t>
             </a:fld>
           </a:p>
@@ -973,7 +973,7 @@
         <p:txBody>
           <a:bodyPr/>
           <a:p>
-            <a:fld id="{D8125E48-CFDE-4F5C-A138-297FE0CF21C4}" type="slidenum">
+            <a:fld id="{90D9DA43-4423-4F0E-ABD1-C4213E6C5590}" type="slidenum">
               <a:t>&lt;#&gt;</a:t>
             </a:fld>
           </a:p>
@@ -1056,7 +1056,7 @@
         <p:txBody>
           <a:bodyPr/>
           <a:p>
-            <a:fld id="{0A84B719-7B7B-4B95-8E81-5DCA025AFB2B}" type="slidenum">
+            <a:fld id="{E68C66E3-D00E-4D11-8A76-D8990BD450A8}" type="slidenum">
               <a:t>&lt;#&gt;</a:t>
             </a:fld>
           </a:p>
@@ -1179,7 +1179,7 @@
         <p:txBody>
           <a:bodyPr/>
           <a:p>
-            <a:fld id="{319860DC-2718-422F-9D37-425242799A4A}" type="slidenum">
+            <a:fld id="{7359076A-2568-4106-956E-EAE163557A71}" type="slidenum">
               <a:t>&lt;#&gt;</a:t>
             </a:fld>
           </a:p>
@@ -1262,7 +1262,7 @@
         <p:txBody>
           <a:bodyPr/>
           <a:p>
-            <a:fld id="{B41EE9FB-A831-4581-BD1A-16155E88805B}" type="slidenum">
+            <a:fld id="{80B7E389-9D92-4FCA-A1AE-4715868549BE}" type="slidenum">
               <a:t>&lt;#&gt;</a:t>
             </a:fld>
           </a:p>
@@ -1726,7 +1726,7 @@
               </a:lnSpc>
               <a:buNone/>
             </a:pPr>
-            <a:fld id="{E5234CF8-4459-409D-9EB7-550A003C0D42}" type="slidenum">
+            <a:fld id="{F198B9A4-F58F-493D-A5D0-1D5E5CE4B0E1}" type="slidenum">
               <a:rPr b="0" lang="en-US" sz="900" spc="-1" strike="noStrike">
                 <a:solidFill>
                   <a:schemeClr val="dk1"/>
@@ -2571,7 +2571,7 @@
               </a:lnSpc>
               <a:buNone/>
             </a:pPr>
-            <a:fld id="{603F2FCB-FCA0-4309-A601-65DA9C879A87}" type="slidenum">
+            <a:fld id="{CF3DFEAF-061C-4317-A0B6-D219A809EACC}" type="slidenum">
               <a:rPr b="0" lang="en-US" sz="900" spc="-1" strike="noStrike">
                 <a:solidFill>
                   <a:schemeClr val="dk1"/>
@@ -3237,7 +3237,7 @@
               </a:lnSpc>
               <a:buNone/>
             </a:pPr>
-            <a:fld id="{26221C1B-9977-4DB5-B16B-B349A13E1F3D}" type="slidenum">
+            <a:fld id="{2F938B7C-0475-4BF1-AAE9-1718C940297C}" type="slidenum">
               <a:rPr b="0" lang="en-US" sz="900" spc="-1" strike="noStrike">
                 <a:solidFill>
                   <a:schemeClr val="dk1"/>
@@ -3778,7 +3778,7 @@
               </a:lnSpc>
               <a:buNone/>
             </a:pPr>
-            <a:fld id="{F2A40274-EB4E-4ECF-A1DD-954F4D17C879}" type="slidenum">
+            <a:fld id="{48FC6779-5CBC-4C70-B8FE-3227C6EB084D}" type="slidenum">
               <a:rPr b="0" lang="en-US" sz="900" spc="-1" strike="noStrike">
                 <a:solidFill>
                   <a:schemeClr val="dk1"/>
@@ -4319,7 +4319,7 @@
               </a:lnSpc>
               <a:buNone/>
             </a:pPr>
-            <a:fld id="{0E6AD5F4-BAD4-4976-8DA4-6928AA5537AF}" type="slidenum">
+            <a:fld id="{D0E4FA14-B9FB-4DC6-823C-491CDD24A803}" type="slidenum">
               <a:rPr b="0" lang="en-US" sz="900" spc="-1" strike="noStrike">
                 <a:solidFill>
                   <a:schemeClr val="dk1"/>
@@ -4914,7 +4914,7 @@
               </a:lnSpc>
               <a:buNone/>
             </a:pPr>
-            <a:fld id="{25BE4503-D4A2-4136-A1B1-C7A4C0BF9286}" type="slidenum">
+            <a:fld id="{EBDE824A-FC5E-4DF3-AEDC-0BC28A1A609D}" type="slidenum">
               <a:rPr b="0" lang="en-US" sz="900" spc="-1" strike="noStrike">
                 <a:solidFill>
                   <a:schemeClr val="dk1"/>
@@ -5336,7 +5336,7 @@
               </a:lnSpc>
               <a:buNone/>
             </a:pPr>
-            <a:fld id="{0AC5E30D-4214-4177-B12A-64421B2E7B83}" type="slidenum">
+            <a:fld id="{5292BBBD-E0B1-4172-A422-BD3C5517DD7B}" type="slidenum">
               <a:rPr b="0" lang="en-US" sz="900" spc="-1" strike="noStrike">
                 <a:solidFill>
                   <a:schemeClr val="dk1"/>
@@ -6110,7 +6110,7 @@
               </a:lnSpc>
               <a:buNone/>
             </a:pPr>
-            <a:fld id="{D9E371BA-2D75-401B-A5BF-DFAAC6DCD8CE}" type="slidenum">
+            <a:fld id="{6D2D165F-5B9E-4D4C-84EE-68DA6CFC38E9}" type="slidenum">
               <a:rPr b="0" lang="en-US" sz="900" spc="-1" strike="noStrike">
                 <a:solidFill>
                   <a:schemeClr val="dk1"/>
@@ -6946,7 +6946,7 @@
               </a:lnSpc>
               <a:buNone/>
             </a:pPr>
-            <a:fld id="{26F56657-3478-4376-9518-9CA08D5633D4}" type="slidenum">
+            <a:fld id="{DC66BDFF-5529-4205-86C5-CC547FC47311}" type="slidenum">
               <a:rPr b="0" lang="en-US" sz="900" spc="-1" strike="noStrike">
                 <a:solidFill>
                   <a:schemeClr val="dk1"/>
@@ -7308,7 +7308,7 @@
               </a:lnSpc>
               <a:buNone/>
             </a:pPr>
-            <a:fld id="{3C29E575-248B-42A5-BE29-7B2F2C66FF63}" type="slidenum">
+            <a:fld id="{132B20CD-1FD3-44EE-ABCC-1719A81A1C1F}" type="slidenum">
               <a:rPr b="0" lang="en-US" sz="900" spc="-1" strike="noStrike">
                 <a:solidFill>
                   <a:schemeClr val="dk1"/>
@@ -7618,7 +7618,7 @@
               </a:lnSpc>
               <a:buNone/>
             </a:pPr>
-            <a:fld id="{F3C9A708-6D95-44AE-8240-BB74C47CCD6E}" type="slidenum">
+            <a:fld id="{60474758-C2B6-4399-9958-9468C0A833AB}" type="slidenum">
               <a:rPr b="0" lang="en-US" sz="900" spc="-1" strike="noStrike">
                 <a:solidFill>
                   <a:schemeClr val="dk1"/>
@@ -10521,6 +10521,52 @@
           </a:p>
         </p:txBody>
       </p:sp>
+      <p:pic>
+        <p:nvPicPr>
+          <p:cNvPr id="148" name="" descr=""/>
+          <p:cNvPicPr/>
+          <p:nvPr/>
+        </p:nvPicPr>
+        <p:blipFill>
+          <a:blip r:embed="rId1"/>
+          <a:stretch/>
+        </p:blipFill>
+        <p:spPr>
+          <a:xfrm>
+            <a:off x="712080" y="1645200"/>
+            <a:ext cx="6667920" cy="4114800"/>
+          </a:xfrm>
+          <a:prstGeom prst="rect">
+            <a:avLst/>
+          </a:prstGeom>
+          <a:ln w="0">
+            <a:noFill/>
+          </a:ln>
+        </p:spPr>
+      </p:pic>
+      <p:pic>
+        <p:nvPicPr>
+          <p:cNvPr id="149" name="" descr=""/>
+          <p:cNvPicPr/>
+          <p:nvPr/>
+        </p:nvPicPr>
+        <p:blipFill>
+          <a:blip r:embed="rId2"/>
+          <a:stretch/>
+        </p:blipFill>
+        <p:spPr>
+          <a:xfrm>
+            <a:off x="3780000" y="1980000"/>
+            <a:ext cx="6667920" cy="4114800"/>
+          </a:xfrm>
+          <a:prstGeom prst="rect">
+            <a:avLst/>
+          </a:prstGeom>
+          <a:ln w="0">
+            <a:noFill/>
+          </a:ln>
+        </p:spPr>
+      </p:pic>
     </p:spTree>
   </p:cSld>
   <mc:AlternateContent>
@@ -10553,7 +10599,7 @@
       </p:grpSpPr>
       <p:sp>
         <p:nvSpPr>
-          <p:cNvPr id="148" name="PlaceHolder 1"/>
+          <p:cNvPr id="150" name="PlaceHolder 1"/>
           <p:cNvSpPr>
             <a:spLocks noGrp="1"/>
           </p:cNvSpPr>
@@ -10593,7 +10639,7 @@
       </p:sp>
       <p:sp>
         <p:nvSpPr>
-          <p:cNvPr id="149" name="PlaceHolder 2"/>
+          <p:cNvPr id="151" name="PlaceHolder 2"/>
           <p:cNvSpPr>
             <a:spLocks noGrp="1"/>
           </p:cNvSpPr>
@@ -10669,7 +10715,7 @@
       </p:grpSpPr>
       <p:sp>
         <p:nvSpPr>
-          <p:cNvPr id="150" name="PlaceHolder 1"/>
+          <p:cNvPr id="152" name="PlaceHolder 1"/>
           <p:cNvSpPr>
             <a:spLocks noGrp="1"/>
           </p:cNvSpPr>
@@ -10709,7 +10755,7 @@
       </p:sp>
       <p:sp>
         <p:nvSpPr>
-          <p:cNvPr id="151" name="PlaceHolder 2"/>
+          <p:cNvPr id="153" name="PlaceHolder 2"/>
           <p:cNvSpPr>
             <a:spLocks noGrp="1"/>
           </p:cNvSpPr>
@@ -10930,7 +10976,25 @@
                 </a:solidFill>
                 <a:latin typeface="Bierstadt"/>
               </a:rPr>
-              <a:t>The datasets we chose represent data from the WHO, found on Kaggle at “World Health Statistics 2020|Complete|Geo-Analysis”  (https://www.kaggle.com/datasets/utkarshxy/who-worldhealth-statistics-2020-complete).</a:t>
+              <a:t>The datasets we chose represent data from the WHO, found on Kaggle at “World Health Statistics </a:t>
+            </a:r>
+            <a:r>
+              <a:rPr b="0" lang="en-GB" sz="1800" spc="-1" strike="noStrike">
+                <a:solidFill>
+                  <a:schemeClr val="dk1"/>
+                </a:solidFill>
+                <a:latin typeface="Bierstadt"/>
+              </a:rPr>
+              <a:t>2020|Complete|Geo-Analysis”  (https://www.kaggle.com/datasets/utkarshxy/who-worldhealth-</a:t>
+            </a:r>
+            <a:r>
+              <a:rPr b="0" lang="en-GB" sz="1800" spc="-1" strike="noStrike">
+                <a:solidFill>
+                  <a:schemeClr val="dk1"/>
+                </a:solidFill>
+                <a:latin typeface="Bierstadt"/>
+              </a:rPr>
+              <a:t>statistics-2020-complete).</a:t>
             </a:r>
             <a:endParaRPr b="0" lang="en-CH" sz="1800" spc="-1" strike="noStrike">
               <a:solidFill>
@@ -10960,7 +11024,34 @@
                 </a:solidFill>
                 <a:latin typeface="Bierstadt"/>
               </a:rPr>
-              <a:t>The data we chose is separated into many different files, each of which only contains only one or two different features describing the state of the world, divided by country and by year. To use data like this, we need to determine which are the most relevant features for our research questions and how to evaluate them.</a:t>
+              <a:t>The data we chose is separated into many different files, each of which only contains only one or </a:t>
+            </a:r>
+            <a:r>
+              <a:rPr b="0" lang="en-GB" sz="1800" spc="-1" strike="noStrike">
+                <a:solidFill>
+                  <a:schemeClr val="dk1"/>
+                </a:solidFill>
+                <a:latin typeface="Bierstadt"/>
+              </a:rPr>
+              <a:t>two different features describing the state of the world, divided by country and by year. To use data </a:t>
+            </a:r>
+            <a:r>
+              <a:rPr b="0" lang="en-GB" sz="1800" spc="-1" strike="noStrike">
+                <a:solidFill>
+                  <a:schemeClr val="dk1"/>
+                </a:solidFill>
+                <a:latin typeface="Bierstadt"/>
+              </a:rPr>
+              <a:t>like this, we need to determine which are the most relevant features for our research questions and </a:t>
+            </a:r>
+            <a:r>
+              <a:rPr b="0" lang="en-GB" sz="1800" spc="-1" strike="noStrike">
+                <a:solidFill>
+                  <a:schemeClr val="dk1"/>
+                </a:solidFill>
+                <a:latin typeface="Bierstadt"/>
+              </a:rPr>
+              <a:t>how to evaluate them.</a:t>
             </a:r>
             <a:endParaRPr b="0" lang="en-CH" sz="1800" spc="-1" strike="noStrike">
               <a:solidFill>

</xml_diff>